<commit_message>
AM fungal trancript code
</commit_message>
<xml_diff>
--- a/Fig 3/SEM.pptx
+++ b/Fig 3/SEM.pptx
@@ -260,7 +260,7 @@
           <a:p>
             <a:fld id="{1494D347-B89D-4141-97A3-D5E757848E71}" type="datetimeFigureOut">
               <a:rPr lang="zh-CN" altLang="en-US" smtClean="0"/>
-              <a:t>2024/5/21</a:t>
+              <a:t>2024/8/15</a:t>
             </a:fld>
             <a:endParaRPr lang="zh-CN" altLang="en-US"/>
           </a:p>
@@ -458,7 +458,7 @@
           <a:p>
             <a:fld id="{1494D347-B89D-4141-97A3-D5E757848E71}" type="datetimeFigureOut">
               <a:rPr lang="zh-CN" altLang="en-US" smtClean="0"/>
-              <a:t>2024/5/21</a:t>
+              <a:t>2024/8/15</a:t>
             </a:fld>
             <a:endParaRPr lang="zh-CN" altLang="en-US"/>
           </a:p>
@@ -666,7 +666,7 @@
           <a:p>
             <a:fld id="{1494D347-B89D-4141-97A3-D5E757848E71}" type="datetimeFigureOut">
               <a:rPr lang="zh-CN" altLang="en-US" smtClean="0"/>
-              <a:t>2024/5/21</a:t>
+              <a:t>2024/8/15</a:t>
             </a:fld>
             <a:endParaRPr lang="zh-CN" altLang="en-US"/>
           </a:p>
@@ -864,7 +864,7 @@
           <a:p>
             <a:fld id="{1494D347-B89D-4141-97A3-D5E757848E71}" type="datetimeFigureOut">
               <a:rPr lang="zh-CN" altLang="en-US" smtClean="0"/>
-              <a:t>2024/5/21</a:t>
+              <a:t>2024/8/15</a:t>
             </a:fld>
             <a:endParaRPr lang="zh-CN" altLang="en-US"/>
           </a:p>
@@ -1139,7 +1139,7 @@
           <a:p>
             <a:fld id="{1494D347-B89D-4141-97A3-D5E757848E71}" type="datetimeFigureOut">
               <a:rPr lang="zh-CN" altLang="en-US" smtClean="0"/>
-              <a:t>2024/5/21</a:t>
+              <a:t>2024/8/15</a:t>
             </a:fld>
             <a:endParaRPr lang="zh-CN" altLang="en-US"/>
           </a:p>
@@ -1404,7 +1404,7 @@
           <a:p>
             <a:fld id="{1494D347-B89D-4141-97A3-D5E757848E71}" type="datetimeFigureOut">
               <a:rPr lang="zh-CN" altLang="en-US" smtClean="0"/>
-              <a:t>2024/5/21</a:t>
+              <a:t>2024/8/15</a:t>
             </a:fld>
             <a:endParaRPr lang="zh-CN" altLang="en-US"/>
           </a:p>
@@ -1816,7 +1816,7 @@
           <a:p>
             <a:fld id="{1494D347-B89D-4141-97A3-D5E757848E71}" type="datetimeFigureOut">
               <a:rPr lang="zh-CN" altLang="en-US" smtClean="0"/>
-              <a:t>2024/5/21</a:t>
+              <a:t>2024/8/15</a:t>
             </a:fld>
             <a:endParaRPr lang="zh-CN" altLang="en-US"/>
           </a:p>
@@ -1957,7 +1957,7 @@
           <a:p>
             <a:fld id="{1494D347-B89D-4141-97A3-D5E757848E71}" type="datetimeFigureOut">
               <a:rPr lang="zh-CN" altLang="en-US" smtClean="0"/>
-              <a:t>2024/5/21</a:t>
+              <a:t>2024/8/15</a:t>
             </a:fld>
             <a:endParaRPr lang="zh-CN" altLang="en-US"/>
           </a:p>
@@ -2070,7 +2070,7 @@
           <a:p>
             <a:fld id="{1494D347-B89D-4141-97A3-D5E757848E71}" type="datetimeFigureOut">
               <a:rPr lang="zh-CN" altLang="en-US" smtClean="0"/>
-              <a:t>2024/5/21</a:t>
+              <a:t>2024/8/15</a:t>
             </a:fld>
             <a:endParaRPr lang="zh-CN" altLang="en-US"/>
           </a:p>
@@ -2381,7 +2381,7 @@
           <a:p>
             <a:fld id="{1494D347-B89D-4141-97A3-D5E757848E71}" type="datetimeFigureOut">
               <a:rPr lang="zh-CN" altLang="en-US" smtClean="0"/>
-              <a:t>2024/5/21</a:t>
+              <a:t>2024/8/15</a:t>
             </a:fld>
             <a:endParaRPr lang="zh-CN" altLang="en-US"/>
           </a:p>
@@ -2669,7 +2669,7 @@
           <a:p>
             <a:fld id="{1494D347-B89D-4141-97A3-D5E757848E71}" type="datetimeFigureOut">
               <a:rPr lang="zh-CN" altLang="en-US" smtClean="0"/>
-              <a:t>2024/5/21</a:t>
+              <a:t>2024/8/15</a:t>
             </a:fld>
             <a:endParaRPr lang="zh-CN" altLang="en-US"/>
           </a:p>
@@ -2910,7 +2910,7 @@
           <a:p>
             <a:fld id="{1494D347-B89D-4141-97A3-D5E757848E71}" type="datetimeFigureOut">
               <a:rPr lang="zh-CN" altLang="en-US" smtClean="0"/>
-              <a:t>2024/5/21</a:t>
+              <a:t>2024/8/15</a:t>
             </a:fld>
             <a:endParaRPr lang="zh-CN" altLang="en-US"/>
           </a:p>
@@ -5111,15 +5111,31 @@
                 <a:ea typeface="等线" panose="02010600030101010101" pitchFamily="2" charset="-122"/>
                 <a:cs typeface="Times New Roman" panose="02020603050405020304" pitchFamily="18" charset="0"/>
               </a:rPr>
-              <a:t>=25.899, </a:t>
-            </a:r>
-            <a:r>
-              <a:rPr lang="en-US" altLang="zh-CN" i="1" dirty="0">
+              <a:t>=25.899</a:t>
+            </a:r>
+            <a:r>
+              <a:rPr lang="en-US" altLang="zh-CN">
                 <a:latin typeface="Times New Roman" panose="02020603050405020304" pitchFamily="18" charset="0"/>
                 <a:ea typeface="等线" panose="02010600030101010101" pitchFamily="2" charset="-122"/>
                 <a:cs typeface="Times New Roman" panose="02020603050405020304" pitchFamily="18" charset="0"/>
               </a:rPr>
-              <a:t>P</a:t>
+              <a:t>, </a:t>
+            </a:r>
+            <a:r>
+              <a:rPr lang="en-US" altLang="zh-CN" i="1">
+                <a:latin typeface="Times New Roman" panose="02020603050405020304" pitchFamily="18" charset="0"/>
+                <a:ea typeface="等线" panose="02010600030101010101" pitchFamily="2" charset="-122"/>
+                <a:cs typeface="Times New Roman" panose="02020603050405020304" pitchFamily="18" charset="0"/>
+              </a:rPr>
+              <a:t>p</a:t>
+            </a:r>
+            <a:r>
+              <a:rPr lang="en-US" altLang="zh-CN">
+                <a:latin typeface="Times New Roman" panose="02020603050405020304" pitchFamily="18" charset="0"/>
+                <a:ea typeface="等线" panose="02010600030101010101" pitchFamily="2" charset="-122"/>
+                <a:cs typeface="Times New Roman" panose="02020603050405020304" pitchFamily="18" charset="0"/>
+              </a:rPr>
+              <a:t>=</a:t>
             </a:r>
             <a:r>
               <a:rPr lang="en-US" altLang="zh-CN" dirty="0">
@@ -5127,7 +5143,7 @@
                 <a:ea typeface="等线" panose="02010600030101010101" pitchFamily="2" charset="-122"/>
                 <a:cs typeface="Times New Roman" panose="02020603050405020304" pitchFamily="18" charset="0"/>
               </a:rPr>
-              <a:t>=0.055, </a:t>
+              <a:t>0.055, </a:t>
             </a:r>
             <a:r>
               <a:rPr lang="en-US" altLang="zh-CN" dirty="0" err="1">

</xml_diff>